<commit_message>
Create template from level 1
</commit_message>
<xml_diff>
--- a/revival_realm/sample_assets.pptx
+++ b/revival_realm/sample_assets.pptx
@@ -107,6 +107,11 @@
       </a:defRPr>
     </a:lvl9pPr>
   </p:defaultTextStyle>
+  <p:extLst>
+    <p:ext uri="{EFAFB233-063F-42B5-8137-9DF3F51BA10A}">
+      <p15:sldGuideLst xmlns:p15="http://schemas.microsoft.com/office/powerpoint/2012/main"/>
+    </p:ext>
+  </p:extLst>
 </p:presentation>
 </file>
 
@@ -192,7 +197,7 @@
           <a:p>
             <a:fld id="{81B5C145-DBB5-D847-B85C-004B271C7F10}" type="datetimeFigureOut">
               <a:rPr lang="en-US" smtClean="0"/>
-              <a:t>2/1/24</a:t>
+              <a:t>2/3/24</a:t>
             </a:fld>
             <a:endParaRPr lang="en-US"/>
           </a:p>
@@ -693,7 +698,7 @@
           <a:p>
             <a:fld id="{AA9F2010-98F6-4F4F-966D-2AA88B4586AE}" type="datetimeFigureOut">
               <a:rPr lang="en-US" smtClean="0"/>
-              <a:t>2/1/24</a:t>
+              <a:t>2/3/24</a:t>
             </a:fld>
             <a:endParaRPr lang="en-US"/>
           </a:p>
@@ -893,7 +898,7 @@
           <a:p>
             <a:fld id="{AA9F2010-98F6-4F4F-966D-2AA88B4586AE}" type="datetimeFigureOut">
               <a:rPr lang="en-US" smtClean="0"/>
-              <a:t>2/1/24</a:t>
+              <a:t>2/3/24</a:t>
             </a:fld>
             <a:endParaRPr lang="en-US"/>
           </a:p>
@@ -1103,7 +1108,7 @@
           <a:p>
             <a:fld id="{AA9F2010-98F6-4F4F-966D-2AA88B4586AE}" type="datetimeFigureOut">
               <a:rPr lang="en-US" smtClean="0"/>
-              <a:t>2/1/24</a:t>
+              <a:t>2/3/24</a:t>
             </a:fld>
             <a:endParaRPr lang="en-US"/>
           </a:p>
@@ -1303,7 +1308,7 @@
           <a:p>
             <a:fld id="{AA9F2010-98F6-4F4F-966D-2AA88B4586AE}" type="datetimeFigureOut">
               <a:rPr lang="en-US" smtClean="0"/>
-              <a:t>2/1/24</a:t>
+              <a:t>2/3/24</a:t>
             </a:fld>
             <a:endParaRPr lang="en-US"/>
           </a:p>
@@ -1579,7 +1584,7 @@
           <a:p>
             <a:fld id="{AA9F2010-98F6-4F4F-966D-2AA88B4586AE}" type="datetimeFigureOut">
               <a:rPr lang="en-US" smtClean="0"/>
-              <a:t>2/1/24</a:t>
+              <a:t>2/3/24</a:t>
             </a:fld>
             <a:endParaRPr lang="en-US"/>
           </a:p>
@@ -1847,7 +1852,7 @@
           <a:p>
             <a:fld id="{AA9F2010-98F6-4F4F-966D-2AA88B4586AE}" type="datetimeFigureOut">
               <a:rPr lang="en-US" smtClean="0"/>
-              <a:t>2/1/24</a:t>
+              <a:t>2/3/24</a:t>
             </a:fld>
             <a:endParaRPr lang="en-US"/>
           </a:p>
@@ -2262,7 +2267,7 @@
           <a:p>
             <a:fld id="{AA9F2010-98F6-4F4F-966D-2AA88B4586AE}" type="datetimeFigureOut">
               <a:rPr lang="en-US" smtClean="0"/>
-              <a:t>2/1/24</a:t>
+              <a:t>2/3/24</a:t>
             </a:fld>
             <a:endParaRPr lang="en-US"/>
           </a:p>
@@ -2404,7 +2409,7 @@
           <a:p>
             <a:fld id="{AA9F2010-98F6-4F4F-966D-2AA88B4586AE}" type="datetimeFigureOut">
               <a:rPr lang="en-US" smtClean="0"/>
-              <a:t>2/1/24</a:t>
+              <a:t>2/3/24</a:t>
             </a:fld>
             <a:endParaRPr lang="en-US"/>
           </a:p>
@@ -2517,7 +2522,7 @@
           <a:p>
             <a:fld id="{AA9F2010-98F6-4F4F-966D-2AA88B4586AE}" type="datetimeFigureOut">
               <a:rPr lang="en-US" smtClean="0"/>
-              <a:t>2/1/24</a:t>
+              <a:t>2/3/24</a:t>
             </a:fld>
             <a:endParaRPr lang="en-US"/>
           </a:p>
@@ -2830,7 +2835,7 @@
           <a:p>
             <a:fld id="{AA9F2010-98F6-4F4F-966D-2AA88B4586AE}" type="datetimeFigureOut">
               <a:rPr lang="en-US" smtClean="0"/>
-              <a:t>2/1/24</a:t>
+              <a:t>2/3/24</a:t>
             </a:fld>
             <a:endParaRPr lang="en-US"/>
           </a:p>
@@ -3119,7 +3124,7 @@
           <a:p>
             <a:fld id="{AA9F2010-98F6-4F4F-966D-2AA88B4586AE}" type="datetimeFigureOut">
               <a:rPr lang="en-US" smtClean="0"/>
-              <a:t>2/1/24</a:t>
+              <a:t>2/3/24</a:t>
             </a:fld>
             <a:endParaRPr lang="en-US"/>
           </a:p>
@@ -3362,7 +3367,7 @@
           <a:p>
             <a:fld id="{AA9F2010-98F6-4F4F-966D-2AA88B4586AE}" type="datetimeFigureOut">
               <a:rPr lang="en-US" smtClean="0"/>
-              <a:t>2/1/24</a:t>
+              <a:t>2/3/24</a:t>
             </a:fld>
             <a:endParaRPr lang="en-US"/>
           </a:p>
@@ -3793,7 +3798,7 @@
         </p:nvGrpSpPr>
         <p:grpSpPr>
           <a:xfrm rot="16200000">
-            <a:off x="836945" y="1667046"/>
+            <a:off x="849765" y="1362072"/>
             <a:ext cx="598714" cy="1197428"/>
             <a:chOff x="1153886" y="1349829"/>
             <a:chExt cx="598714" cy="1197428"/>
@@ -3912,14 +3917,14 @@
         </p:nvSpPr>
         <p:spPr>
           <a:xfrm>
-            <a:off x="550408" y="665620"/>
-            <a:ext cx="598714" cy="598714"/>
+            <a:off x="550407" y="665619"/>
+            <a:ext cx="4786361" cy="4786361"/>
           </a:xfrm>
           <a:prstGeom prst="rect">
             <a:avLst/>
           </a:prstGeom>
           <a:solidFill>
-            <a:srgbClr val="FF0000"/>
+            <a:schemeClr val="accent6"/>
           </a:solidFill>
         </p:spPr>
         <p:style>
@@ -3961,7 +3966,7 @@
         </p:nvGrpSpPr>
         <p:grpSpPr>
           <a:xfrm rot="16200000">
-            <a:off x="1074352" y="2470775"/>
+            <a:off x="1058257" y="1960786"/>
             <a:ext cx="598714" cy="1796142"/>
             <a:chOff x="3276600" y="1344386"/>
             <a:chExt cx="598714" cy="1796142"/>
@@ -4129,7 +4134,7 @@
         </p:nvGrpSpPr>
         <p:grpSpPr>
           <a:xfrm>
-            <a:off x="3302867" y="774418"/>
+            <a:off x="3431069" y="1126302"/>
             <a:ext cx="1197427" cy="1191985"/>
             <a:chOff x="3161796" y="754024"/>
             <a:chExt cx="1197427" cy="1191985"/>
@@ -4223,7 +4228,7 @@
             <a:lstStyle/>
             <a:p>
               <a:pPr algn="ctr"/>
-              <a:endParaRPr lang="en-US"/>
+              <a:endParaRPr lang="en-US" dirty="0"/>
             </a:p>
           </p:txBody>
         </p:sp>
@@ -4334,7 +4339,7 @@
         </p:nvGrpSpPr>
         <p:grpSpPr>
           <a:xfrm>
-            <a:off x="510612" y="3984654"/>
+            <a:off x="502565" y="3610645"/>
             <a:ext cx="1197428" cy="1197428"/>
             <a:chOff x="4996013" y="782432"/>
             <a:chExt cx="1197428" cy="1197428"/>
@@ -4502,7 +4507,7 @@
         </p:nvGrpSpPr>
         <p:grpSpPr>
           <a:xfrm>
-            <a:off x="3302866" y="5943970"/>
+            <a:off x="3443642" y="271517"/>
             <a:ext cx="2394856" cy="598714"/>
             <a:chOff x="1326969" y="3820886"/>
             <a:chExt cx="2394856" cy="598714"/>
@@ -4719,7 +4724,7 @@
         </p:nvGrpSpPr>
         <p:grpSpPr>
           <a:xfrm>
-            <a:off x="6715285" y="665620"/>
+            <a:off x="6690880" y="458569"/>
             <a:ext cx="1377155" cy="1787977"/>
             <a:chOff x="8968067" y="560614"/>
             <a:chExt cx="1197427" cy="1787977"/>
@@ -4985,7 +4990,7 @@
         </p:nvGrpSpPr>
         <p:grpSpPr>
           <a:xfrm>
-            <a:off x="3308962" y="4449077"/>
+            <a:off x="3121271" y="4808073"/>
             <a:ext cx="1796142" cy="1196483"/>
             <a:chOff x="6660801" y="859971"/>
             <a:chExt cx="1796142" cy="1196483"/>
@@ -5223,7 +5228,7 @@
         </p:nvGrpSpPr>
         <p:grpSpPr>
           <a:xfrm>
-            <a:off x="3539156" y="2470775"/>
+            <a:off x="3338408" y="2652462"/>
             <a:ext cx="1197428" cy="1796142"/>
             <a:chOff x="4013228" y="2231572"/>
             <a:chExt cx="1197428" cy="1796142"/>
@@ -5461,7 +5466,7 @@
         </p:nvGrpSpPr>
         <p:grpSpPr>
           <a:xfrm>
-            <a:off x="9262479" y="3850835"/>
+            <a:off x="9294579" y="3183394"/>
             <a:ext cx="1796142" cy="1795198"/>
             <a:chOff x="6347717" y="2831230"/>
             <a:chExt cx="1796142" cy="1795198"/>
@@ -5959,7 +5964,7 @@
         </p:nvGrpSpPr>
         <p:grpSpPr>
           <a:xfrm>
-            <a:off x="6498318" y="2690320"/>
+            <a:off x="6454126" y="2690075"/>
             <a:ext cx="1800754" cy="1796142"/>
             <a:chOff x="7988650" y="2565117"/>
             <a:chExt cx="1800754" cy="1796142"/>
@@ -6267,7 +6272,7 @@
         </p:nvGrpSpPr>
         <p:grpSpPr>
           <a:xfrm>
-            <a:off x="9099669" y="1065088"/>
+            <a:off x="9129911" y="465891"/>
             <a:ext cx="1796142" cy="1794252"/>
             <a:chOff x="9909047" y="4614053"/>
             <a:chExt cx="1796142" cy="1794252"/>
@@ -6560,7 +6565,7 @@
         </p:nvGrpSpPr>
         <p:grpSpPr>
           <a:xfrm>
-            <a:off x="6780744" y="4706007"/>
+            <a:off x="6376468" y="4679235"/>
             <a:ext cx="1197428" cy="1797603"/>
             <a:chOff x="3776332" y="4620768"/>
             <a:chExt cx="1197428" cy="1797603"/>

</xml_diff>